<commit_message>
Changes made to presentation / Gannt Chart needs to be added.
</commit_message>
<xml_diff>
--- a/Paperwork/Presentation of App.pptx
+++ b/Paperwork/Presentation of App.pptx
@@ -874,7 +874,7 @@
           <a:p>
             <a:fld id="{7F85BF19-B2B1-4A25-B4DF-10B0D63AE374}" type="datetimeFigureOut">
               <a:rPr lang="en-GB" smtClean="0"/>
-              <a:t>10/12/2020</a:t>
+              <a:t>17/12/2020</a:t>
             </a:fld>
             <a:endParaRPr lang="en-GB"/>
           </a:p>
@@ -1124,7 +1124,7 @@
           <a:p>
             <a:fld id="{7F85BF19-B2B1-4A25-B4DF-10B0D63AE374}" type="datetimeFigureOut">
               <a:rPr lang="en-GB" smtClean="0"/>
-              <a:t>10/12/2020</a:t>
+              <a:t>17/12/2020</a:t>
             </a:fld>
             <a:endParaRPr lang="en-GB"/>
           </a:p>
@@ -1437,7 +1437,7 @@
           <a:p>
             <a:fld id="{7F85BF19-B2B1-4A25-B4DF-10B0D63AE374}" type="datetimeFigureOut">
               <a:rPr lang="en-GB" smtClean="0"/>
-              <a:t>10/12/2020</a:t>
+              <a:t>17/12/2020</a:t>
             </a:fld>
             <a:endParaRPr lang="en-GB"/>
           </a:p>
@@ -1777,7 +1777,7 @@
           <a:p>
             <a:fld id="{7F85BF19-B2B1-4A25-B4DF-10B0D63AE374}" type="datetimeFigureOut">
               <a:rPr lang="en-GB" smtClean="0"/>
-              <a:t>10/12/2020</a:t>
+              <a:t>17/12/2020</a:t>
             </a:fld>
             <a:endParaRPr lang="en-GB"/>
           </a:p>
@@ -2090,7 +2090,7 @@
           <a:p>
             <a:fld id="{7F85BF19-B2B1-4A25-B4DF-10B0D63AE374}" type="datetimeFigureOut">
               <a:rPr lang="en-GB" smtClean="0"/>
-              <a:t>10/12/2020</a:t>
+              <a:t>17/12/2020</a:t>
             </a:fld>
             <a:endParaRPr lang="en-GB"/>
           </a:p>
@@ -2482,7 +2482,7 @@
           <a:p>
             <a:fld id="{7F85BF19-B2B1-4A25-B4DF-10B0D63AE374}" type="datetimeFigureOut">
               <a:rPr lang="en-GB" smtClean="0"/>
-              <a:t>10/12/2020</a:t>
+              <a:t>17/12/2020</a:t>
             </a:fld>
             <a:endParaRPr lang="en-GB"/>
           </a:p>
@@ -2650,7 +2650,7 @@
           <a:p>
             <a:fld id="{7F85BF19-B2B1-4A25-B4DF-10B0D63AE374}" type="datetimeFigureOut">
               <a:rPr lang="en-GB" smtClean="0"/>
-              <a:t>10/12/2020</a:t>
+              <a:t>17/12/2020</a:t>
             </a:fld>
             <a:endParaRPr lang="en-GB"/>
           </a:p>
@@ -2828,7 +2828,7 @@
           <a:p>
             <a:fld id="{7F85BF19-B2B1-4A25-B4DF-10B0D63AE374}" type="datetimeFigureOut">
               <a:rPr lang="en-GB" smtClean="0"/>
-              <a:t>10/12/2020</a:t>
+              <a:t>17/12/2020</a:t>
             </a:fld>
             <a:endParaRPr lang="en-GB"/>
           </a:p>
@@ -3002,7 +3002,7 @@
           <a:p>
             <a:fld id="{7F85BF19-B2B1-4A25-B4DF-10B0D63AE374}" type="datetimeFigureOut">
               <a:rPr lang="en-GB" smtClean="0"/>
-              <a:t>10/12/2020</a:t>
+              <a:t>17/12/2020</a:t>
             </a:fld>
             <a:endParaRPr lang="en-GB"/>
           </a:p>
@@ -3248,7 +3248,7 @@
           <a:p>
             <a:fld id="{7F85BF19-B2B1-4A25-B4DF-10B0D63AE374}" type="datetimeFigureOut">
               <a:rPr lang="en-GB" smtClean="0"/>
-              <a:t>10/12/2020</a:t>
+              <a:t>17/12/2020</a:t>
             </a:fld>
             <a:endParaRPr lang="en-GB"/>
           </a:p>
@@ -3477,7 +3477,7 @@
           <a:p>
             <a:fld id="{7F85BF19-B2B1-4A25-B4DF-10B0D63AE374}" type="datetimeFigureOut">
               <a:rPr lang="en-GB" smtClean="0"/>
-              <a:t>10/12/2020</a:t>
+              <a:t>17/12/2020</a:t>
             </a:fld>
             <a:endParaRPr lang="en-GB"/>
           </a:p>
@@ -3848,7 +3848,7 @@
           <a:p>
             <a:fld id="{7F85BF19-B2B1-4A25-B4DF-10B0D63AE374}" type="datetimeFigureOut">
               <a:rPr lang="en-GB" smtClean="0"/>
-              <a:t>10/12/2020</a:t>
+              <a:t>17/12/2020</a:t>
             </a:fld>
             <a:endParaRPr lang="en-GB"/>
           </a:p>
@@ -3970,7 +3970,7 @@
           <a:p>
             <a:fld id="{7F85BF19-B2B1-4A25-B4DF-10B0D63AE374}" type="datetimeFigureOut">
               <a:rPr lang="en-GB" smtClean="0"/>
-              <a:t>10/12/2020</a:t>
+              <a:t>17/12/2020</a:t>
             </a:fld>
             <a:endParaRPr lang="en-GB"/>
           </a:p>
@@ -4065,7 +4065,7 @@
           <a:p>
             <a:fld id="{7F85BF19-B2B1-4A25-B4DF-10B0D63AE374}" type="datetimeFigureOut">
               <a:rPr lang="en-GB" smtClean="0"/>
-              <a:t>10/12/2020</a:t>
+              <a:t>17/12/2020</a:t>
             </a:fld>
             <a:endParaRPr lang="en-GB"/>
           </a:p>
@@ -4318,7 +4318,7 @@
           <a:p>
             <a:fld id="{7F85BF19-B2B1-4A25-B4DF-10B0D63AE374}" type="datetimeFigureOut">
               <a:rPr lang="en-GB" smtClean="0"/>
-              <a:t>10/12/2020</a:t>
+              <a:t>17/12/2020</a:t>
             </a:fld>
             <a:endParaRPr lang="en-GB"/>
           </a:p>
@@ -4579,7 +4579,7 @@
           <a:p>
             <a:fld id="{7F85BF19-B2B1-4A25-B4DF-10B0D63AE374}" type="datetimeFigureOut">
               <a:rPr lang="en-GB" smtClean="0"/>
-              <a:t>10/12/2020</a:t>
+              <a:t>17/12/2020</a:t>
             </a:fld>
             <a:endParaRPr lang="en-GB"/>
           </a:p>
@@ -5320,7 +5320,7 @@
           <a:p>
             <a:fld id="{7F85BF19-B2B1-4A25-B4DF-10B0D63AE374}" type="datetimeFigureOut">
               <a:rPr lang="en-GB" smtClean="0"/>
-              <a:t>10/12/2020</a:t>
+              <a:t>17/12/2020</a:t>
             </a:fld>
             <a:endParaRPr lang="en-GB"/>
           </a:p>
@@ -6095,30 +6095,30 @@
           <a:lstStyle/>
           <a:p>
             <a:r>
-              <a:rPr lang="en-GB"/>
-              <a:t>An application that allows employees to clock in via their smartphone to help prevent the transmission of Covid-19</a:t>
-            </a:r>
-          </a:p>
-          <a:p>
-            <a:r>
-              <a:rPr lang="en-GB"/>
-              <a:t>The employee will only be able to clock in when they are in the workplace and will have to use their front-facing camera to confirm they are an employee</a:t>
-            </a:r>
-          </a:p>
-          <a:p>
-            <a:r>
-              <a:rPr lang="en-GB"/>
-              <a:t>The clock in times will be recorded for the manager to view, thus removing the need for a physical clock-in system</a:t>
-            </a:r>
-          </a:p>
-          <a:p>
-            <a:endParaRPr lang="en-GB"/>
+              <a:rPr lang="en-GB" dirty="0"/>
+              <a:t>An application that allows employees to clock in via their smartphone to help prevent the transmission of Covid-19 in the workplace.</a:t>
+            </a:r>
+          </a:p>
+          <a:p>
+            <a:r>
+              <a:rPr lang="en-GB" dirty="0"/>
+              <a:t>The employee will only be able to clock in when they are in the workplace and will have to use their front-facing camera to confirm their identify.</a:t>
+            </a:r>
+          </a:p>
+          <a:p>
+            <a:r>
+              <a:rPr lang="en-GB" dirty="0"/>
+              <a:t>The clock in times will be recorded for the manager to view, thus removing the need for a physical clock-in system. This will be only be accessible to the manager who will have to also use their camera to confirm their identity thus protecting employee data.</a:t>
+            </a:r>
+          </a:p>
+          <a:p>
+            <a:endParaRPr lang="en-GB" dirty="0"/>
           </a:p>
           <a:p>
             <a:pPr marL="0" indent="0">
               <a:buNone/>
             </a:pPr>
-            <a:endParaRPr lang="en-GB"/>
+            <a:endParaRPr lang="en-GB" dirty="0"/>
           </a:p>
         </p:txBody>
       </p:sp>
@@ -6672,21 +6672,6 @@
 </file>
 
 <file path=customXml/item1.xml><?xml version="1.0" encoding="utf-8"?>
-<?mso-contentType ?>
-<FormTemplates xmlns="http://schemas.microsoft.com/sharepoint/v3/contenttype/forms">
-  <Display>DocumentLibraryForm</Display>
-  <Edit>DocumentLibraryForm</Edit>
-  <New>DocumentLibraryForm</New>
-</FormTemplates>
-</file>
-
-<file path=customXml/item2.xml><?xml version="1.0" encoding="utf-8"?>
-<p:properties xmlns:p="http://schemas.microsoft.com/office/2006/metadata/properties" xmlns:xsi="http://www.w3.org/2001/XMLSchema-instance" xmlns:pc="http://schemas.microsoft.com/office/infopath/2007/PartnerControls">
-  <documentManagement/>
-</p:properties>
-</file>
-
-<file path=customXml/item3.xml><?xml version="1.0" encoding="utf-8"?>
 <ct:contentTypeSchema xmlns:ct="http://schemas.microsoft.com/office/2006/metadata/contentType" xmlns:ma="http://schemas.microsoft.com/office/2006/metadata/properties/metaAttributes" ct:_="" ma:_="" ma:contentTypeName="Document" ma:contentTypeID="0x0101004AA4CDFC536C5141B66943D36C9A5F45" ma:contentTypeVersion="8" ma:contentTypeDescription="Create a new document." ma:contentTypeScope="" ma:versionID="9a8eecdcd5bc871c60399d1e3af6007a">
   <xsd:schema xmlns:xsd="http://www.w3.org/2001/XMLSchema" xmlns:xs="http://www.w3.org/2001/XMLSchema" xmlns:p="http://schemas.microsoft.com/office/2006/metadata/properties" xmlns:ns2="3d405d2a-a0f6-4812-8ee2-e2a77e83df5d" targetNamespace="http://schemas.microsoft.com/office/2006/metadata/properties" ma:root="true" ma:fieldsID="edc5762960ccf472ff35dbb85aa7af4d" ns2:_="">
     <xsd:import namespace="3d405d2a-a0f6-4812-8ee2-e2a77e83df5d"/>
@@ -6858,24 +6843,22 @@
 </ct:contentTypeSchema>
 </file>
 
-<file path=customXml/itemProps1.xml><?xml version="1.0" encoding="utf-8"?>
-<ds:datastoreItem xmlns:ds="http://schemas.openxmlformats.org/officeDocument/2006/customXml" ds:itemID="{C2D1AE89-407D-4569-B12D-CFB142874C1C}">
-  <ds:schemaRefs>
-    <ds:schemaRef ds:uri="http://schemas.microsoft.com/sharepoint/v3/contenttype/forms"/>
-  </ds:schemaRefs>
-</ds:datastoreItem>
+<file path=customXml/item2.xml><?xml version="1.0" encoding="utf-8"?>
+<p:properties xmlns:p="http://schemas.microsoft.com/office/2006/metadata/properties" xmlns:xsi="http://www.w3.org/2001/XMLSchema-instance" xmlns:pc="http://schemas.microsoft.com/office/infopath/2007/PartnerControls">
+  <documentManagement/>
+</p:properties>
 </file>
 
-<file path=customXml/itemProps2.xml><?xml version="1.0" encoding="utf-8"?>
-<ds:datastoreItem xmlns:ds="http://schemas.openxmlformats.org/officeDocument/2006/customXml" ds:itemID="{BB3F2926-B7B3-4E79-817A-F2F41A795C4A}">
-  <ds:schemaRefs>
-    <ds:schemaRef ds:uri="http://schemas.microsoft.com/office/2006/metadata/properties"/>
-    <ds:schemaRef ds:uri="http://schemas.microsoft.com/office/infopath/2007/PartnerControls"/>
-  </ds:schemaRefs>
-</ds:datastoreItem>
+<file path=customXml/item3.xml><?xml version="1.0" encoding="utf-8"?>
+<?mso-contentType ?>
+<FormTemplates xmlns="http://schemas.microsoft.com/sharepoint/v3/contenttype/forms">
+  <Display>DocumentLibraryForm</Display>
+  <Edit>DocumentLibraryForm</Edit>
+  <New>DocumentLibraryForm</New>
+</FormTemplates>
 </file>
 
-<file path=customXml/itemProps3.xml><?xml version="1.0" encoding="utf-8"?>
+<file path=customXml/itemProps1.xml><?xml version="1.0" encoding="utf-8"?>
 <ds:datastoreItem xmlns:ds="http://schemas.openxmlformats.org/officeDocument/2006/customXml" ds:itemID="{6FAF6889-925B-4D1D-8080-F1DFD3AF7A4F}">
   <ds:schemaRefs>
     <ds:schemaRef ds:uri="3d405d2a-a0f6-4812-8ee2-e2a77e83df5d"/>
@@ -6891,4 +6874,21 @@
     <ds:schemaRef ds:uri="http://www.w3.org/2001/XMLSchema"/>
   </ds:schemaRefs>
 </ds:datastoreItem>
+</file>
+
+<file path=customXml/itemProps2.xml><?xml version="1.0" encoding="utf-8"?>
+<ds:datastoreItem xmlns:ds="http://schemas.openxmlformats.org/officeDocument/2006/customXml" ds:itemID="{BB3F2926-B7B3-4E79-817A-F2F41A795C4A}">
+  <ds:schemaRefs>
+    <ds:schemaRef ds:uri="http://schemas.microsoft.com/office/2006/metadata/properties"/>
+    <ds:schemaRef ds:uri="http://schemas.microsoft.com/office/infopath/2007/PartnerControls"/>
+  </ds:schemaRefs>
+</ds:datastoreItem>
+</file>
+
+<file path=customXml/itemProps3.xml><?xml version="1.0" encoding="utf-8"?>
+<ds:datastoreItem xmlns:ds="http://schemas.openxmlformats.org/officeDocument/2006/customXml" ds:itemID="{C2D1AE89-407D-4569-B12D-CFB142874C1C}">
+  <ds:schemaRefs>
+    <ds:schemaRef ds:uri="http://schemas.microsoft.com/sharepoint/v3/contenttype/forms"/>
+  </ds:schemaRefs>
+</ds:datastoreItem>
 </file>
</xml_diff>

<commit_message>
Screencast added and chnages made to presentation slides.
</commit_message>
<xml_diff>
--- a/Paperwork/Presentation of App.pptx
+++ b/Paperwork/Presentation of App.pptx
@@ -10,7 +10,9 @@
     <p:sldId id="258" r:id="rId7"/>
     <p:sldId id="259" r:id="rId8"/>
     <p:sldId id="260" r:id="rId9"/>
-    <p:sldId id="261" r:id="rId10"/>
+    <p:sldId id="263" r:id="rId10"/>
+    <p:sldId id="262" r:id="rId11"/>
+    <p:sldId id="261" r:id="rId12"/>
   </p:sldIdLst>
   <p:sldSz cx="12192000" cy="6858000"/>
   <p:notesSz cx="6858000" cy="9144000"/>
@@ -6267,9 +6269,10 @@
           <a:lstStyle/>
           <a:p>
             <a:r>
-              <a:rPr lang="en-GB"/>
-              <a:t>Prototype</a:t>
-            </a:r>
+              <a:rPr lang="en-US"/>
+              <a:t>Our Prototype</a:t>
+            </a:r>
+            <a:endParaRPr lang="en-GB" dirty="0"/>
           </a:p>
         </p:txBody>
       </p:sp>
@@ -6322,6 +6325,356 @@
 </file>
 
 <file path=ppt/slides/slide6.xml><?xml version="1.0" encoding="utf-8"?>
+<p:sld xmlns:a="http://schemas.openxmlformats.org/drawingml/2006/main" xmlns:r="http://schemas.openxmlformats.org/officeDocument/2006/relationships" xmlns:p="http://schemas.openxmlformats.org/presentationml/2006/main">
+  <p:cSld>
+    <p:spTree>
+      <p:nvGrpSpPr>
+        <p:cNvPr id="1" name=""/>
+        <p:cNvGrpSpPr/>
+        <p:nvPr/>
+      </p:nvGrpSpPr>
+      <p:grpSpPr>
+        <a:xfrm>
+          <a:off x="0" y="0"/>
+          <a:ext cx="0" cy="0"/>
+          <a:chOff x="0" y="0"/>
+          <a:chExt cx="0" cy="0"/>
+        </a:xfrm>
+      </p:grpSpPr>
+      <p:sp>
+        <p:nvSpPr>
+          <p:cNvPr id="2" name="Title 1">
+            <a:extLst>
+              <a:ext uri="{FF2B5EF4-FFF2-40B4-BE49-F238E27FC236}">
+                <a16:creationId xmlns:a16="http://schemas.microsoft.com/office/drawing/2014/main" id="{638C6994-B9CB-4325-89DA-F9C4929E8C2B}"/>
+              </a:ext>
+            </a:extLst>
+          </p:cNvPr>
+          <p:cNvSpPr>
+            <a:spLocks noGrp="1"/>
+          </p:cNvSpPr>
+          <p:nvPr>
+            <p:ph type="title"/>
+          </p:nvPr>
+        </p:nvSpPr>
+        <p:spPr/>
+        <p:txBody>
+          <a:bodyPr/>
+          <a:lstStyle/>
+          <a:p>
+            <a:r>
+              <a:rPr lang="en-US" dirty="0"/>
+              <a:t>Our Prototype</a:t>
+            </a:r>
+          </a:p>
+        </p:txBody>
+      </p:sp>
+      <p:pic>
+        <p:nvPicPr>
+          <p:cNvPr id="4" name="Recording #6">
+            <a:hlinkClick r:id="" action="ppaction://media"/>
+            <a:extLst>
+              <a:ext uri="{FF2B5EF4-FFF2-40B4-BE49-F238E27FC236}">
+                <a16:creationId xmlns:a16="http://schemas.microsoft.com/office/drawing/2014/main" id="{308D1B8A-C8A2-4623-A4B9-26C16EE249BC}"/>
+              </a:ext>
+            </a:extLst>
+          </p:cNvPr>
+          <p:cNvPicPr>
+            <a:picLocks noGrp="1" noChangeAspect="1"/>
+          </p:cNvPicPr>
+          <p:nvPr>
+            <p:ph idx="1"/>
+            <a:videoFile r:link="rId2"/>
+            <p:extLst>
+              <p:ext uri="{DAA4B4D4-6D71-4841-9C94-3DE7FCFB9230}">
+                <p14:media xmlns:p14="http://schemas.microsoft.com/office/powerpoint/2010/main" r:embed="rId1"/>
+              </p:ext>
+            </p:extLst>
+          </p:nvPr>
+        </p:nvPicPr>
+        <p:blipFill>
+          <a:blip r:embed="rId4"/>
+          <a:stretch>
+            <a:fillRect/>
+          </a:stretch>
+        </p:blipFill>
+        <p:spPr>
+          <a:xfrm>
+            <a:off x="1266807" y="1270000"/>
+            <a:ext cx="9658386" cy="5432425"/>
+          </a:xfrm>
+        </p:spPr>
+      </p:pic>
+    </p:spTree>
+    <p:extLst>
+      <p:ext uri="{BB962C8B-B14F-4D97-AF65-F5344CB8AC3E}">
+        <p14:creationId xmlns:p14="http://schemas.microsoft.com/office/powerpoint/2010/main" val="841343479"/>
+      </p:ext>
+    </p:extLst>
+  </p:cSld>
+  <p:clrMapOvr>
+    <a:masterClrMapping/>
+  </p:clrMapOvr>
+  <p:timing>
+    <p:tnLst>
+      <p:par>
+        <p:cTn id="1" dur="indefinite" restart="never" nodeType="tmRoot">
+          <p:childTnLst>
+            <p:seq concurrent="1" nextAc="seek">
+              <p:cTn id="2" dur="indefinite" nodeType="mainSeq">
+                <p:childTnLst>
+                  <p:par>
+                    <p:cTn id="3" fill="hold">
+                      <p:stCondLst>
+                        <p:cond delay="indefinite"/>
+                      </p:stCondLst>
+                      <p:childTnLst>
+                        <p:par>
+                          <p:cTn id="4" fill="hold">
+                            <p:stCondLst>
+                              <p:cond delay="0"/>
+                            </p:stCondLst>
+                            <p:childTnLst>
+                              <p:par>
+                                <p:cTn id="5" presetID="1" presetClass="mediacall" presetSubtype="0" fill="hold" nodeType="clickEffect">
+                                  <p:stCondLst>
+                                    <p:cond delay="0"/>
+                                  </p:stCondLst>
+                                  <p:childTnLst>
+                                    <p:cmd type="call" cmd="playFrom(0.0)">
+                                      <p:cBhvr>
+                                        <p:cTn id="6" dur="41000" fill="hold"/>
+                                        <p:tgtEl>
+                                          <p:spTgt spid="4"/>
+                                        </p:tgtEl>
+                                      </p:cBhvr>
+                                    </p:cmd>
+                                  </p:childTnLst>
+                                </p:cTn>
+                              </p:par>
+                            </p:childTnLst>
+                          </p:cTn>
+                        </p:par>
+                      </p:childTnLst>
+                    </p:cTn>
+                  </p:par>
+                </p:childTnLst>
+              </p:cTn>
+              <p:prevCondLst>
+                <p:cond evt="onPrev" delay="0">
+                  <p:tgtEl>
+                    <p:sldTgt/>
+                  </p:tgtEl>
+                </p:cond>
+              </p:prevCondLst>
+              <p:nextCondLst>
+                <p:cond evt="onNext" delay="0">
+                  <p:tgtEl>
+                    <p:sldTgt/>
+                  </p:tgtEl>
+                </p:cond>
+              </p:nextCondLst>
+            </p:seq>
+            <p:video>
+              <p:cMediaNode vol="80000">
+                <p:cTn id="7" fill="hold" display="0">
+                  <p:stCondLst>
+                    <p:cond delay="indefinite"/>
+                  </p:stCondLst>
+                </p:cTn>
+                <p:tgtEl>
+                  <p:spTgt spid="4"/>
+                </p:tgtEl>
+              </p:cMediaNode>
+            </p:video>
+            <p:seq concurrent="1" nextAc="seek">
+              <p:cTn id="8" restart="whenNotActive" fill="hold" evtFilter="cancelBubble" nodeType="interactiveSeq">
+                <p:stCondLst>
+                  <p:cond evt="onClick" delay="0">
+                    <p:tgtEl>
+                      <p:spTgt spid="4"/>
+                    </p:tgtEl>
+                  </p:cond>
+                </p:stCondLst>
+                <p:endSync evt="end" delay="0">
+                  <p:rtn val="all"/>
+                </p:endSync>
+                <p:childTnLst>
+                  <p:par>
+                    <p:cTn id="9" fill="hold">
+                      <p:stCondLst>
+                        <p:cond delay="0"/>
+                      </p:stCondLst>
+                      <p:childTnLst>
+                        <p:par>
+                          <p:cTn id="10" fill="hold">
+                            <p:stCondLst>
+                              <p:cond delay="0"/>
+                            </p:stCondLst>
+                            <p:childTnLst>
+                              <p:par>
+                                <p:cTn id="11" presetID="2" presetClass="mediacall" presetSubtype="0" fill="hold" nodeType="clickEffect">
+                                  <p:stCondLst>
+                                    <p:cond delay="0"/>
+                                  </p:stCondLst>
+                                  <p:childTnLst>
+                                    <p:cmd type="call" cmd="togglePause">
+                                      <p:cBhvr>
+                                        <p:cTn id="12" dur="1" fill="hold"/>
+                                        <p:tgtEl>
+                                          <p:spTgt spid="4"/>
+                                        </p:tgtEl>
+                                      </p:cBhvr>
+                                    </p:cmd>
+                                  </p:childTnLst>
+                                </p:cTn>
+                              </p:par>
+                            </p:childTnLst>
+                          </p:cTn>
+                        </p:par>
+                      </p:childTnLst>
+                    </p:cTn>
+                  </p:par>
+                </p:childTnLst>
+              </p:cTn>
+              <p:nextCondLst>
+                <p:cond evt="onClick" delay="0">
+                  <p:tgtEl>
+                    <p:spTgt spid="4"/>
+                  </p:tgtEl>
+                </p:cond>
+              </p:nextCondLst>
+            </p:seq>
+          </p:childTnLst>
+        </p:cTn>
+      </p:par>
+    </p:tnLst>
+  </p:timing>
+</p:sld>
+</file>
+
+<file path=ppt/slides/slide7.xml><?xml version="1.0" encoding="utf-8"?>
+<p:sld xmlns:a="http://schemas.openxmlformats.org/drawingml/2006/main" xmlns:r="http://schemas.openxmlformats.org/officeDocument/2006/relationships" xmlns:p="http://schemas.openxmlformats.org/presentationml/2006/main">
+  <p:cSld>
+    <p:spTree>
+      <p:nvGrpSpPr>
+        <p:cNvPr id="1" name=""/>
+        <p:cNvGrpSpPr/>
+        <p:nvPr/>
+      </p:nvGrpSpPr>
+      <p:grpSpPr>
+        <a:xfrm>
+          <a:off x="0" y="0"/>
+          <a:ext cx="0" cy="0"/>
+          <a:chOff x="0" y="0"/>
+          <a:chExt cx="0" cy="0"/>
+        </a:xfrm>
+      </p:grpSpPr>
+      <p:sp>
+        <p:nvSpPr>
+          <p:cNvPr id="2" name="Title 1">
+            <a:extLst>
+              <a:ext uri="{FF2B5EF4-FFF2-40B4-BE49-F238E27FC236}">
+                <a16:creationId xmlns:a16="http://schemas.microsoft.com/office/drawing/2014/main" id="{6D01CE00-CE4A-4DB1-9425-0528FE9A7C89}"/>
+              </a:ext>
+            </a:extLst>
+          </p:cNvPr>
+          <p:cNvSpPr>
+            <a:spLocks noGrp="1"/>
+          </p:cNvSpPr>
+          <p:nvPr>
+            <p:ph type="title"/>
+          </p:nvPr>
+        </p:nvSpPr>
+        <p:spPr>
+          <a:xfrm>
+            <a:off x="692458" y="609600"/>
+            <a:ext cx="8581544" cy="500109"/>
+          </a:xfrm>
+        </p:spPr>
+        <p:txBody>
+          <a:bodyPr>
+            <a:normAutofit fontScale="90000"/>
+          </a:bodyPr>
+          <a:lstStyle/>
+          <a:p>
+            <a:r>
+              <a:rPr lang="en-US" dirty="0"/>
+              <a:t>Git Commit History </a:t>
+            </a:r>
+            <a:br>
+              <a:rPr lang="en-US" dirty="0"/>
+            </a:br>
+            <a:r>
+              <a:rPr lang="en-US" sz="1300" dirty="0"/>
+              <a:t>https://github.com/ryanhiggins11/FINAL-YEAR-PROJECT/commits/master</a:t>
+            </a:r>
+          </a:p>
+        </p:txBody>
+      </p:sp>
+      <p:pic>
+        <p:nvPicPr>
+          <p:cNvPr id="1026" name="Picture 2">
+            <a:extLst>
+              <a:ext uri="{FF2B5EF4-FFF2-40B4-BE49-F238E27FC236}">
+                <a16:creationId xmlns:a16="http://schemas.microsoft.com/office/drawing/2014/main" id="{E6C00058-5366-4612-B7A0-44F3A8F3FBEE}"/>
+              </a:ext>
+            </a:extLst>
+          </p:cNvPr>
+          <p:cNvPicPr>
+            <a:picLocks noGrp="1" noChangeAspect="1" noChangeArrowheads="1"/>
+          </p:cNvPicPr>
+          <p:nvPr>
+            <p:ph idx="1"/>
+          </p:nvPr>
+        </p:nvPicPr>
+        <p:blipFill>
+          <a:blip r:embed="rId2">
+            <a:extLst>
+              <a:ext uri="{28A0092B-C50C-407E-A947-70E740481C1C}">
+                <a14:useLocalDpi xmlns:a14="http://schemas.microsoft.com/office/drawing/2010/main" val="0"/>
+              </a:ext>
+            </a:extLst>
+          </a:blip>
+          <a:srcRect/>
+          <a:stretch>
+            <a:fillRect/>
+          </a:stretch>
+        </p:blipFill>
+        <p:spPr bwMode="auto">
+          <a:xfrm>
+            <a:off x="1696221" y="1402672"/>
+            <a:ext cx="6574017" cy="4961138"/>
+          </a:xfrm>
+          <a:prstGeom prst="rect">
+            <a:avLst/>
+          </a:prstGeom>
+          <a:noFill/>
+          <a:extLst>
+            <a:ext uri="{909E8E84-426E-40DD-AFC4-6F175D3DCCD1}">
+              <a14:hiddenFill xmlns:a14="http://schemas.microsoft.com/office/drawing/2010/main">
+                <a:solidFill>
+                  <a:srgbClr val="FFFFFF"/>
+                </a:solidFill>
+              </a14:hiddenFill>
+            </a:ext>
+          </a:extLst>
+        </p:spPr>
+      </p:pic>
+    </p:spTree>
+    <p:extLst>
+      <p:ext uri="{BB962C8B-B14F-4D97-AF65-F5344CB8AC3E}">
+        <p14:creationId xmlns:p14="http://schemas.microsoft.com/office/powerpoint/2010/main" val="3330839390"/>
+      </p:ext>
+    </p:extLst>
+  </p:cSld>
+  <p:clrMapOvr>
+    <a:masterClrMapping/>
+  </p:clrMapOvr>
+</p:sld>
+</file>
+
+<file path=ppt/slides/slide8.xml><?xml version="1.0" encoding="utf-8"?>
 <p:sld xmlns:a="http://schemas.openxmlformats.org/drawingml/2006/main" xmlns:r="http://schemas.openxmlformats.org/officeDocument/2006/relationships" xmlns:p="http://schemas.openxmlformats.org/presentationml/2006/main">
   <p:cSld>
     <p:spTree>
@@ -6666,21 +7019,6 @@
 </file>
 
 <file path=customXml/item1.xml><?xml version="1.0" encoding="utf-8"?>
-<?mso-contentType ?>
-<FormTemplates xmlns="http://schemas.microsoft.com/sharepoint/v3/contenttype/forms">
-  <Display>DocumentLibraryForm</Display>
-  <Edit>DocumentLibraryForm</Edit>
-  <New>DocumentLibraryForm</New>
-</FormTemplates>
-</file>
-
-<file path=customXml/item2.xml><?xml version="1.0" encoding="utf-8"?>
-<p:properties xmlns:p="http://schemas.microsoft.com/office/2006/metadata/properties" xmlns:xsi="http://www.w3.org/2001/XMLSchema-instance" xmlns:pc="http://schemas.microsoft.com/office/infopath/2007/PartnerControls">
-  <documentManagement/>
-</p:properties>
-</file>
-
-<file path=customXml/item3.xml><?xml version="1.0" encoding="utf-8"?>
 <ct:contentTypeSchema xmlns:ct="http://schemas.microsoft.com/office/2006/metadata/contentType" xmlns:ma="http://schemas.microsoft.com/office/2006/metadata/properties/metaAttributes" ct:_="" ma:_="" ma:contentTypeName="Document" ma:contentTypeID="0x0101004AA4CDFC536C5141B66943D36C9A5F45" ma:contentTypeVersion="8" ma:contentTypeDescription="Create a new document." ma:contentTypeScope="" ma:versionID="9a8eecdcd5bc871c60399d1e3af6007a">
   <xsd:schema xmlns:xsd="http://www.w3.org/2001/XMLSchema" xmlns:xs="http://www.w3.org/2001/XMLSchema" xmlns:p="http://schemas.microsoft.com/office/2006/metadata/properties" xmlns:ns2="3d405d2a-a0f6-4812-8ee2-e2a77e83df5d" targetNamespace="http://schemas.microsoft.com/office/2006/metadata/properties" ma:root="true" ma:fieldsID="edc5762960ccf472ff35dbb85aa7af4d" ns2:_="">
     <xsd:import namespace="3d405d2a-a0f6-4812-8ee2-e2a77e83df5d"/>
@@ -6852,24 +7190,22 @@
 </ct:contentTypeSchema>
 </file>
 
-<file path=customXml/itemProps1.xml><?xml version="1.0" encoding="utf-8"?>
-<ds:datastoreItem xmlns:ds="http://schemas.openxmlformats.org/officeDocument/2006/customXml" ds:itemID="{C2D1AE89-407D-4569-B12D-CFB142874C1C}">
-  <ds:schemaRefs>
-    <ds:schemaRef ds:uri="http://schemas.microsoft.com/sharepoint/v3/contenttype/forms"/>
-  </ds:schemaRefs>
-</ds:datastoreItem>
+<file path=customXml/item2.xml><?xml version="1.0" encoding="utf-8"?>
+<p:properties xmlns:p="http://schemas.microsoft.com/office/2006/metadata/properties" xmlns:xsi="http://www.w3.org/2001/XMLSchema-instance" xmlns:pc="http://schemas.microsoft.com/office/infopath/2007/PartnerControls">
+  <documentManagement/>
+</p:properties>
 </file>
 
-<file path=customXml/itemProps2.xml><?xml version="1.0" encoding="utf-8"?>
-<ds:datastoreItem xmlns:ds="http://schemas.openxmlformats.org/officeDocument/2006/customXml" ds:itemID="{BB3F2926-B7B3-4E79-817A-F2F41A795C4A}">
-  <ds:schemaRefs>
-    <ds:schemaRef ds:uri="http://schemas.microsoft.com/office/2006/metadata/properties"/>
-    <ds:schemaRef ds:uri="http://schemas.microsoft.com/office/infopath/2007/PartnerControls"/>
-  </ds:schemaRefs>
-</ds:datastoreItem>
+<file path=customXml/item3.xml><?xml version="1.0" encoding="utf-8"?>
+<?mso-contentType ?>
+<FormTemplates xmlns="http://schemas.microsoft.com/sharepoint/v3/contenttype/forms">
+  <Display>DocumentLibraryForm</Display>
+  <Edit>DocumentLibraryForm</Edit>
+  <New>DocumentLibraryForm</New>
+</FormTemplates>
 </file>
 
-<file path=customXml/itemProps3.xml><?xml version="1.0" encoding="utf-8"?>
+<file path=customXml/itemProps1.xml><?xml version="1.0" encoding="utf-8"?>
 <ds:datastoreItem xmlns:ds="http://schemas.openxmlformats.org/officeDocument/2006/customXml" ds:itemID="{6FAF6889-925B-4D1D-8080-F1DFD3AF7A4F}">
   <ds:schemaRefs>
     <ds:schemaRef ds:uri="3d405d2a-a0f6-4812-8ee2-e2a77e83df5d"/>
@@ -6885,4 +7221,21 @@
     <ds:schemaRef ds:uri="http://www.w3.org/2001/XMLSchema"/>
   </ds:schemaRefs>
 </ds:datastoreItem>
+</file>
+
+<file path=customXml/itemProps2.xml><?xml version="1.0" encoding="utf-8"?>
+<ds:datastoreItem xmlns:ds="http://schemas.openxmlformats.org/officeDocument/2006/customXml" ds:itemID="{BB3F2926-B7B3-4E79-817A-F2F41A795C4A}">
+  <ds:schemaRefs>
+    <ds:schemaRef ds:uri="http://schemas.microsoft.com/office/2006/metadata/properties"/>
+    <ds:schemaRef ds:uri="http://schemas.microsoft.com/office/infopath/2007/PartnerControls"/>
+  </ds:schemaRefs>
+</ds:datastoreItem>
+</file>
+
+<file path=customXml/itemProps3.xml><?xml version="1.0" encoding="utf-8"?>
+<ds:datastoreItem xmlns:ds="http://schemas.openxmlformats.org/officeDocument/2006/customXml" ds:itemID="{C2D1AE89-407D-4569-B12D-CFB142874C1C}">
+  <ds:schemaRefs>
+    <ds:schemaRef ds:uri="http://schemas.microsoft.com/sharepoint/v3/contenttype/forms"/>
+  </ds:schemaRefs>
+</ds:datastoreItem>
 </file>
</xml_diff>

<commit_message>
Changes made to the presentation.
</commit_message>
<xml_diff>
--- a/Paperwork/Presentation of App.pptx
+++ b/Paperwork/Presentation of App.pptx
@@ -6,13 +6,12 @@
   </p:sldMasterIdLst>
   <p:sldIdLst>
     <p:sldId id="256" r:id="rId5"/>
-    <p:sldId id="257" r:id="rId6"/>
-    <p:sldId id="258" r:id="rId7"/>
-    <p:sldId id="259" r:id="rId8"/>
-    <p:sldId id="260" r:id="rId9"/>
-    <p:sldId id="263" r:id="rId10"/>
-    <p:sldId id="262" r:id="rId11"/>
-    <p:sldId id="261" r:id="rId12"/>
+    <p:sldId id="258" r:id="rId6"/>
+    <p:sldId id="259" r:id="rId7"/>
+    <p:sldId id="260" r:id="rId8"/>
+    <p:sldId id="263" r:id="rId9"/>
+    <p:sldId id="262" r:id="rId10"/>
+    <p:sldId id="261" r:id="rId11"/>
   </p:sldIdLst>
   <p:sldSz cx="12192000" cy="6858000"/>
   <p:notesSz cx="6858000" cy="9144000"/>
@@ -5896,15 +5895,20 @@
           <a:lstStyle/>
           <a:p>
             <a:r>
-              <a:rPr lang="en-GB"/>
+              <a:rPr lang="en-GB" dirty="0"/>
               <a:t>Ryan Higgins, Daniel Gallagher, Shane McCormack, Jack McNamee</a:t>
             </a:r>
           </a:p>
           <a:p>
             <a:r>
-              <a:rPr lang="en-GB"/>
-              <a:t>Advised by Joseph Corr</a:t>
-            </a:r>
+              <a:rPr lang="en-GB" dirty="0"/>
+              <a:t>Supervisor Joseph </a:t>
+            </a:r>
+            <a:r>
+              <a:rPr lang="en-GB" dirty="0" err="1"/>
+              <a:t>Corr</a:t>
+            </a:r>
+            <a:endParaRPr lang="en-GB" dirty="0"/>
           </a:p>
         </p:txBody>
       </p:sp>
@@ -5943,113 +5947,6 @@
           <p:cNvPr id="2" name="Title 1">
             <a:extLst>
               <a:ext uri="{FF2B5EF4-FFF2-40B4-BE49-F238E27FC236}">
-                <a16:creationId xmlns:a16="http://schemas.microsoft.com/office/drawing/2014/main" id="{290FB43D-3569-468D-AE95-0CE82EEC08C9}"/>
-              </a:ext>
-            </a:extLst>
-          </p:cNvPr>
-          <p:cNvSpPr>
-            <a:spLocks noGrp="1"/>
-          </p:cNvSpPr>
-          <p:nvPr>
-            <p:ph type="title"/>
-          </p:nvPr>
-        </p:nvSpPr>
-        <p:spPr/>
-        <p:txBody>
-          <a:bodyPr/>
-          <a:lstStyle/>
-          <a:p>
-            <a:r>
-              <a:rPr lang="en-GB"/>
-              <a:t>Table of Contents</a:t>
-            </a:r>
-          </a:p>
-        </p:txBody>
-      </p:sp>
-      <p:sp>
-        <p:nvSpPr>
-          <p:cNvPr id="3" name="Content Placeholder 2">
-            <a:extLst>
-              <a:ext uri="{FF2B5EF4-FFF2-40B4-BE49-F238E27FC236}">
-                <a16:creationId xmlns:a16="http://schemas.microsoft.com/office/drawing/2014/main" id="{047CFEF6-CA02-4A8F-BCB9-BA4E30BE934D}"/>
-              </a:ext>
-            </a:extLst>
-          </p:cNvPr>
-          <p:cNvSpPr>
-            <a:spLocks noGrp="1"/>
-          </p:cNvSpPr>
-          <p:nvPr>
-            <p:ph idx="1"/>
-          </p:nvPr>
-        </p:nvSpPr>
-        <p:spPr/>
-        <p:txBody>
-          <a:bodyPr/>
-          <a:lstStyle/>
-          <a:p>
-            <a:r>
-              <a:rPr lang="en-GB"/>
-              <a:t>Project Overview</a:t>
-            </a:r>
-          </a:p>
-          <a:p>
-            <a:r>
-              <a:rPr lang="en-GB"/>
-              <a:t>Project Architecture</a:t>
-            </a:r>
-          </a:p>
-          <a:p>
-            <a:r>
-              <a:rPr lang="en-GB"/>
-              <a:t>Prototype</a:t>
-            </a:r>
-          </a:p>
-          <a:p>
-            <a:r>
-              <a:rPr lang="en-GB"/>
-              <a:t>Timeline</a:t>
-            </a:r>
-          </a:p>
-          <a:p>
-            <a:endParaRPr lang="en-GB"/>
-          </a:p>
-        </p:txBody>
-      </p:sp>
-    </p:spTree>
-    <p:extLst>
-      <p:ext uri="{BB962C8B-B14F-4D97-AF65-F5344CB8AC3E}">
-        <p14:creationId xmlns:p14="http://schemas.microsoft.com/office/powerpoint/2010/main" val="727246055"/>
-      </p:ext>
-    </p:extLst>
-  </p:cSld>
-  <p:clrMapOvr>
-    <a:masterClrMapping/>
-  </p:clrMapOvr>
-</p:sld>
-</file>
-
-<file path=ppt/slides/slide3.xml><?xml version="1.0" encoding="utf-8"?>
-<p:sld xmlns:a="http://schemas.openxmlformats.org/drawingml/2006/main" xmlns:r="http://schemas.openxmlformats.org/officeDocument/2006/relationships" xmlns:p="http://schemas.openxmlformats.org/presentationml/2006/main">
-  <p:cSld>
-    <p:spTree>
-      <p:nvGrpSpPr>
-        <p:cNvPr id="1" name=""/>
-        <p:cNvGrpSpPr/>
-        <p:nvPr/>
-      </p:nvGrpSpPr>
-      <p:grpSpPr>
-        <a:xfrm>
-          <a:off x="0" y="0"/>
-          <a:ext cx="0" cy="0"/>
-          <a:chOff x="0" y="0"/>
-          <a:chExt cx="0" cy="0"/>
-        </a:xfrm>
-      </p:grpSpPr>
-      <p:sp>
-        <p:nvSpPr>
-          <p:cNvPr id="2" name="Title 1">
-            <a:extLst>
-              <a:ext uri="{FF2B5EF4-FFF2-40B4-BE49-F238E27FC236}">
                 <a16:creationId xmlns:a16="http://schemas.microsoft.com/office/drawing/2014/main" id="{F5A3ED70-0FB0-48E4-B1F2-385C45C8066B}"/>
               </a:ext>
             </a:extLst>
@@ -6111,6 +6008,12 @@
             <a:r>
               <a:rPr lang="en-GB" dirty="0"/>
               <a:t>The clock in times will be recorded for the manager to view, thus removing the need for a physical clock-in system. This will be only be accessible to the manager who will have to also use their camera to confirm their identity thus protecting employee data.</a:t>
+            </a:r>
+          </a:p>
+          <a:p>
+            <a:r>
+              <a:rPr lang="en-GB" dirty="0"/>
+              <a:t>Key Objectives – Learning Kotlin (new language) / Making something that could help in the real world / Developing something we all are interested in.</a:t>
             </a:r>
           </a:p>
           <a:p>
@@ -6137,7 +6040,7 @@
 </p:sld>
 </file>
 
-<file path=ppt/slides/slide4.xml><?xml version="1.0" encoding="utf-8"?>
+<file path=ppt/slides/slide3.xml><?xml version="1.0" encoding="utf-8"?>
 <p:sld xmlns:a="http://schemas.openxmlformats.org/drawingml/2006/main" xmlns:r="http://schemas.openxmlformats.org/officeDocument/2006/relationships" xmlns:p="http://schemas.openxmlformats.org/presentationml/2006/main">
   <p:cSld>
     <p:spTree>
@@ -6230,7 +6133,7 @@
 </p:sld>
 </file>
 
-<file path=ppt/slides/slide5.xml><?xml version="1.0" encoding="utf-8"?>
+<file path=ppt/slides/slide4.xml><?xml version="1.0" encoding="utf-8"?>
 <p:sld xmlns:a="http://schemas.openxmlformats.org/drawingml/2006/main" xmlns:r="http://schemas.openxmlformats.org/officeDocument/2006/relationships" xmlns:p="http://schemas.openxmlformats.org/presentationml/2006/main">
   <p:cSld>
     <p:spTree>
@@ -6324,7 +6227,7 @@
 </p:sld>
 </file>
 
-<file path=ppt/slides/slide6.xml><?xml version="1.0" encoding="utf-8"?>
+<file path=ppt/slides/slide5.xml><?xml version="1.0" encoding="utf-8"?>
 <p:sld xmlns:a="http://schemas.openxmlformats.org/drawingml/2006/main" xmlns:r="http://schemas.openxmlformats.org/officeDocument/2006/relationships" xmlns:p="http://schemas.openxmlformats.org/presentationml/2006/main">
   <p:cSld>
     <p:spTree>
@@ -6400,7 +6303,7 @@
         </p:blipFill>
         <p:spPr>
           <a:xfrm>
-            <a:off x="1266807" y="1270000"/>
+            <a:off x="1275685" y="1270000"/>
             <a:ext cx="9658386" cy="5432425"/>
           </a:xfrm>
         </p:spPr>
@@ -6553,7 +6456,7 @@
 </p:sld>
 </file>
 
-<file path=ppt/slides/slide7.xml><?xml version="1.0" encoding="utf-8"?>
+<file path=ppt/slides/slide6.xml><?xml version="1.0" encoding="utf-8"?>
 <p:sld xmlns:a="http://schemas.openxmlformats.org/drawingml/2006/main" xmlns:r="http://schemas.openxmlformats.org/officeDocument/2006/relationships" xmlns:p="http://schemas.openxmlformats.org/presentationml/2006/main">
   <p:cSld>
     <p:spTree>
@@ -6674,7 +6577,7 @@
 </p:sld>
 </file>
 
-<file path=ppt/slides/slide8.xml><?xml version="1.0" encoding="utf-8"?>
+<file path=ppt/slides/slide7.xml><?xml version="1.0" encoding="utf-8"?>
 <p:sld xmlns:a="http://schemas.openxmlformats.org/drawingml/2006/main" xmlns:r="http://schemas.openxmlformats.org/officeDocument/2006/relationships" xmlns:p="http://schemas.openxmlformats.org/presentationml/2006/main">
   <p:cSld>
     <p:spTree>
@@ -7019,6 +6922,21 @@
 </file>
 
 <file path=customXml/item1.xml><?xml version="1.0" encoding="utf-8"?>
+<?mso-contentType ?>
+<FormTemplates xmlns="http://schemas.microsoft.com/sharepoint/v3/contenttype/forms">
+  <Display>DocumentLibraryForm</Display>
+  <Edit>DocumentLibraryForm</Edit>
+  <New>DocumentLibraryForm</New>
+</FormTemplates>
+</file>
+
+<file path=customXml/item2.xml><?xml version="1.0" encoding="utf-8"?>
+<p:properties xmlns:p="http://schemas.microsoft.com/office/2006/metadata/properties" xmlns:xsi="http://www.w3.org/2001/XMLSchema-instance" xmlns:pc="http://schemas.microsoft.com/office/infopath/2007/PartnerControls">
+  <documentManagement/>
+</p:properties>
+</file>
+
+<file path=customXml/item3.xml><?xml version="1.0" encoding="utf-8"?>
 <ct:contentTypeSchema xmlns:ct="http://schemas.microsoft.com/office/2006/metadata/contentType" xmlns:ma="http://schemas.microsoft.com/office/2006/metadata/properties/metaAttributes" ct:_="" ma:_="" ma:contentTypeName="Document" ma:contentTypeID="0x0101004AA4CDFC536C5141B66943D36C9A5F45" ma:contentTypeVersion="8" ma:contentTypeDescription="Create a new document." ma:contentTypeScope="" ma:versionID="9a8eecdcd5bc871c60399d1e3af6007a">
   <xsd:schema xmlns:xsd="http://www.w3.org/2001/XMLSchema" xmlns:xs="http://www.w3.org/2001/XMLSchema" xmlns:p="http://schemas.microsoft.com/office/2006/metadata/properties" xmlns:ns2="3d405d2a-a0f6-4812-8ee2-e2a77e83df5d" targetNamespace="http://schemas.microsoft.com/office/2006/metadata/properties" ma:root="true" ma:fieldsID="edc5762960ccf472ff35dbb85aa7af4d" ns2:_="">
     <xsd:import namespace="3d405d2a-a0f6-4812-8ee2-e2a77e83df5d"/>
@@ -7190,22 +7108,24 @@
 </ct:contentTypeSchema>
 </file>
 
-<file path=customXml/item2.xml><?xml version="1.0" encoding="utf-8"?>
-<p:properties xmlns:p="http://schemas.microsoft.com/office/2006/metadata/properties" xmlns:xsi="http://www.w3.org/2001/XMLSchema-instance" xmlns:pc="http://schemas.microsoft.com/office/infopath/2007/PartnerControls">
-  <documentManagement/>
-</p:properties>
+<file path=customXml/itemProps1.xml><?xml version="1.0" encoding="utf-8"?>
+<ds:datastoreItem xmlns:ds="http://schemas.openxmlformats.org/officeDocument/2006/customXml" ds:itemID="{C2D1AE89-407D-4569-B12D-CFB142874C1C}">
+  <ds:schemaRefs>
+    <ds:schemaRef ds:uri="http://schemas.microsoft.com/sharepoint/v3/contenttype/forms"/>
+  </ds:schemaRefs>
+</ds:datastoreItem>
 </file>
 
-<file path=customXml/item3.xml><?xml version="1.0" encoding="utf-8"?>
-<?mso-contentType ?>
-<FormTemplates xmlns="http://schemas.microsoft.com/sharepoint/v3/contenttype/forms">
-  <Display>DocumentLibraryForm</Display>
-  <Edit>DocumentLibraryForm</Edit>
-  <New>DocumentLibraryForm</New>
-</FormTemplates>
+<file path=customXml/itemProps2.xml><?xml version="1.0" encoding="utf-8"?>
+<ds:datastoreItem xmlns:ds="http://schemas.openxmlformats.org/officeDocument/2006/customXml" ds:itemID="{BB3F2926-B7B3-4E79-817A-F2F41A795C4A}">
+  <ds:schemaRefs>
+    <ds:schemaRef ds:uri="http://schemas.microsoft.com/office/2006/metadata/properties"/>
+    <ds:schemaRef ds:uri="http://schemas.microsoft.com/office/infopath/2007/PartnerControls"/>
+  </ds:schemaRefs>
+</ds:datastoreItem>
 </file>
 
-<file path=customXml/itemProps1.xml><?xml version="1.0" encoding="utf-8"?>
+<file path=customXml/itemProps3.xml><?xml version="1.0" encoding="utf-8"?>
 <ds:datastoreItem xmlns:ds="http://schemas.openxmlformats.org/officeDocument/2006/customXml" ds:itemID="{6FAF6889-925B-4D1D-8080-F1DFD3AF7A4F}">
   <ds:schemaRefs>
     <ds:schemaRef ds:uri="3d405d2a-a0f6-4812-8ee2-e2a77e83df5d"/>
@@ -7221,21 +7141,4 @@
     <ds:schemaRef ds:uri="http://www.w3.org/2001/XMLSchema"/>
   </ds:schemaRefs>
 </ds:datastoreItem>
-</file>
-
-<file path=customXml/itemProps2.xml><?xml version="1.0" encoding="utf-8"?>
-<ds:datastoreItem xmlns:ds="http://schemas.openxmlformats.org/officeDocument/2006/customXml" ds:itemID="{BB3F2926-B7B3-4E79-817A-F2F41A795C4A}">
-  <ds:schemaRefs>
-    <ds:schemaRef ds:uri="http://schemas.microsoft.com/office/2006/metadata/properties"/>
-    <ds:schemaRef ds:uri="http://schemas.microsoft.com/office/infopath/2007/PartnerControls"/>
-  </ds:schemaRefs>
-</ds:datastoreItem>
-</file>
-
-<file path=customXml/itemProps3.xml><?xml version="1.0" encoding="utf-8"?>
-<ds:datastoreItem xmlns:ds="http://schemas.openxmlformats.org/officeDocument/2006/customXml" ds:itemID="{C2D1AE89-407D-4569-B12D-CFB142874C1C}">
-  <ds:schemaRefs>
-    <ds:schemaRef ds:uri="http://schemas.microsoft.com/sharepoint/v3/contenttype/forms"/>
-  </ds:schemaRefs>
-</ds:datastoreItem>
 </file>
</xml_diff>